<commit_message>
added figure on cloud app model
</commit_message>
<xml_diff>
--- a/Eager/paper/oopsla/figures/FigureDesigns.pptx
+++ b/Eager/paper/oopsla/figures/FigureDesigns.pptx
@@ -6,6 +6,7 @@
   </p:sldMasterIdLst>
   <p:sldIdLst>
     <p:sldId id="257" r:id="rId2"/>
+    <p:sldId id="258" r:id="rId3"/>
   </p:sldIdLst>
   <p:sldSz cx="9144000" cy="6858000" type="screen4x3"/>
   <p:notesSz cx="6858000" cy="9144000"/>
@@ -288,7 +289,7 @@
           <a:p>
             <a:fld id="{5180D103-0C4C-A84A-B553-E839CDB1FABE}" type="datetimeFigureOut">
               <a:rPr lang="en-US" smtClean="0"/>
-              <a:t>3/9/15</a:t>
+              <a:t>3/15/15</a:t>
             </a:fld>
             <a:endParaRPr lang="en-US"/>
           </a:p>
@@ -458,7 +459,7 @@
           <a:p>
             <a:fld id="{5180D103-0C4C-A84A-B553-E839CDB1FABE}" type="datetimeFigureOut">
               <a:rPr lang="en-US" smtClean="0"/>
-              <a:t>3/9/15</a:t>
+              <a:t>3/15/15</a:t>
             </a:fld>
             <a:endParaRPr lang="en-US"/>
           </a:p>
@@ -638,7 +639,7 @@
           <a:p>
             <a:fld id="{5180D103-0C4C-A84A-B553-E839CDB1FABE}" type="datetimeFigureOut">
               <a:rPr lang="en-US" smtClean="0"/>
-              <a:t>3/9/15</a:t>
+              <a:t>3/15/15</a:t>
             </a:fld>
             <a:endParaRPr lang="en-US"/>
           </a:p>
@@ -808,7 +809,7 @@
           <a:p>
             <a:fld id="{5180D103-0C4C-A84A-B553-E839CDB1FABE}" type="datetimeFigureOut">
               <a:rPr lang="en-US" smtClean="0"/>
-              <a:t>3/9/15</a:t>
+              <a:t>3/15/15</a:t>
             </a:fld>
             <a:endParaRPr lang="en-US"/>
           </a:p>
@@ -1054,7 +1055,7 @@
           <a:p>
             <a:fld id="{5180D103-0C4C-A84A-B553-E839CDB1FABE}" type="datetimeFigureOut">
               <a:rPr lang="en-US" smtClean="0"/>
-              <a:t>3/9/15</a:t>
+              <a:t>3/15/15</a:t>
             </a:fld>
             <a:endParaRPr lang="en-US"/>
           </a:p>
@@ -1342,7 +1343,7 @@
           <a:p>
             <a:fld id="{5180D103-0C4C-A84A-B553-E839CDB1FABE}" type="datetimeFigureOut">
               <a:rPr lang="en-US" smtClean="0"/>
-              <a:t>3/9/15</a:t>
+              <a:t>3/15/15</a:t>
             </a:fld>
             <a:endParaRPr lang="en-US"/>
           </a:p>
@@ -1764,7 +1765,7 @@
           <a:p>
             <a:fld id="{5180D103-0C4C-A84A-B553-E839CDB1FABE}" type="datetimeFigureOut">
               <a:rPr lang="en-US" smtClean="0"/>
-              <a:t>3/9/15</a:t>
+              <a:t>3/15/15</a:t>
             </a:fld>
             <a:endParaRPr lang="en-US"/>
           </a:p>
@@ -1882,7 +1883,7 @@
           <a:p>
             <a:fld id="{5180D103-0C4C-A84A-B553-E839CDB1FABE}" type="datetimeFigureOut">
               <a:rPr lang="en-US" smtClean="0"/>
-              <a:t>3/9/15</a:t>
+              <a:t>3/15/15</a:t>
             </a:fld>
             <a:endParaRPr lang="en-US"/>
           </a:p>
@@ -1977,7 +1978,7 @@
           <a:p>
             <a:fld id="{5180D103-0C4C-A84A-B553-E839CDB1FABE}" type="datetimeFigureOut">
               <a:rPr lang="en-US" smtClean="0"/>
-              <a:t>3/9/15</a:t>
+              <a:t>3/15/15</a:t>
             </a:fld>
             <a:endParaRPr lang="en-US"/>
           </a:p>
@@ -2254,7 +2255,7 @@
           <a:p>
             <a:fld id="{5180D103-0C4C-A84A-B553-E839CDB1FABE}" type="datetimeFigureOut">
               <a:rPr lang="en-US" smtClean="0"/>
-              <a:t>3/9/15</a:t>
+              <a:t>3/15/15</a:t>
             </a:fld>
             <a:endParaRPr lang="en-US"/>
           </a:p>
@@ -2507,7 +2508,7 @@
           <a:p>
             <a:fld id="{5180D103-0C4C-A84A-B553-E839CDB1FABE}" type="datetimeFigureOut">
               <a:rPr lang="en-US" smtClean="0"/>
-              <a:t>3/9/15</a:t>
+              <a:t>3/15/15</a:t>
             </a:fld>
             <a:endParaRPr lang="en-US"/>
           </a:p>
@@ -2720,7 +2721,7 @@
           <a:p>
             <a:fld id="{5180D103-0C4C-A84A-B553-E839CDB1FABE}" type="datetimeFigureOut">
               <a:rPr lang="en-US" smtClean="0"/>
-              <a:t>3/9/15</a:t>
+              <a:t>3/15/15</a:t>
             </a:fld>
             <a:endParaRPr lang="en-US"/>
           </a:p>
@@ -3626,6 +3627,590 @@
   <p:clrMapOvr>
     <a:masterClrMapping/>
   </p:clrMapOvr>
+  <p:timing>
+    <p:tnLst>
+      <p:par>
+        <p:cTn xmlns:p14="http://schemas.microsoft.com/office/powerpoint/2010/main" id="1" dur="indefinite" restart="never" nodeType="tmRoot"/>
+      </p:par>
+    </p:tnLst>
+  </p:timing>
+</p:sld>
+</file>
+
+<file path=ppt/slides/slide2.xml><?xml version="1.0" encoding="utf-8"?>
+<p:sld xmlns:a="http://schemas.openxmlformats.org/drawingml/2006/main" xmlns:r="http://schemas.openxmlformats.org/officeDocument/2006/relationships" xmlns:p="http://schemas.openxmlformats.org/presentationml/2006/main">
+  <p:cSld>
+    <p:spTree>
+      <p:nvGrpSpPr>
+        <p:cNvPr id="1" name=""/>
+        <p:cNvGrpSpPr/>
+        <p:nvPr/>
+      </p:nvGrpSpPr>
+      <p:grpSpPr>
+        <a:xfrm>
+          <a:off x="0" y="0"/>
+          <a:ext cx="0" cy="0"/>
+          <a:chOff x="0" y="0"/>
+          <a:chExt cx="0" cy="0"/>
+        </a:xfrm>
+      </p:grpSpPr>
+      <p:sp>
+        <p:nvSpPr>
+          <p:cNvPr id="18" name="Cloud 17"/>
+          <p:cNvSpPr/>
+          <p:nvPr/>
+        </p:nvSpPr>
+        <p:spPr>
+          <a:xfrm>
+            <a:off x="307474" y="2179053"/>
+            <a:ext cx="8582526" cy="5414210"/>
+          </a:xfrm>
+          <a:prstGeom prst="cloud">
+            <a:avLst/>
+          </a:prstGeom>
+          <a:solidFill>
+            <a:schemeClr val="bg1">
+              <a:lumMod val="75000"/>
+            </a:schemeClr>
+          </a:solidFill>
+          <a:ln>
+            <a:noFill/>
+          </a:ln>
+        </p:spPr>
+        <p:style>
+          <a:lnRef idx="1">
+            <a:schemeClr val="accent1"/>
+          </a:lnRef>
+          <a:fillRef idx="3">
+            <a:schemeClr val="accent1"/>
+          </a:fillRef>
+          <a:effectRef idx="2">
+            <a:schemeClr val="accent1"/>
+          </a:effectRef>
+          <a:fontRef idx="minor">
+            <a:schemeClr val="lt1"/>
+          </a:fontRef>
+        </p:style>
+        <p:txBody>
+          <a:bodyPr rtlCol="0" anchor="ctr"/>
+          <a:lstStyle/>
+          <a:p>
+            <a:pPr algn="ctr"/>
+            <a:endParaRPr lang="en-US"/>
+          </a:p>
+        </p:txBody>
+      </p:sp>
+      <p:sp>
+        <p:nvSpPr>
+          <p:cNvPr id="5" name="Rectangle 4"/>
+          <p:cNvSpPr/>
+          <p:nvPr/>
+        </p:nvSpPr>
+        <p:spPr>
+          <a:xfrm>
+            <a:off x="1630949" y="5120105"/>
+            <a:ext cx="5641472" cy="1243264"/>
+          </a:xfrm>
+          <a:prstGeom prst="rect">
+            <a:avLst/>
+          </a:prstGeom>
+          <a:ln>
+            <a:noFill/>
+          </a:ln>
+        </p:spPr>
+        <p:style>
+          <a:lnRef idx="2">
+            <a:schemeClr val="accent2">
+              <a:shade val="50000"/>
+            </a:schemeClr>
+          </a:lnRef>
+          <a:fillRef idx="1">
+            <a:schemeClr val="accent2"/>
+          </a:fillRef>
+          <a:effectRef idx="0">
+            <a:schemeClr val="accent2"/>
+          </a:effectRef>
+          <a:fontRef idx="minor">
+            <a:schemeClr val="lt1"/>
+          </a:fontRef>
+        </p:style>
+        <p:txBody>
+          <a:bodyPr rtlCol="0" anchor="ctr"/>
+          <a:lstStyle/>
+          <a:p>
+            <a:pPr algn="ctr"/>
+            <a:r>
+              <a:rPr lang="en-US" dirty="0" smtClean="0"/>
+              <a:t>Cloud SDK</a:t>
+            </a:r>
+          </a:p>
+          <a:p>
+            <a:pPr algn="ctr"/>
+            <a:r>
+              <a:rPr lang="en-US" dirty="0" smtClean="0"/>
+              <a:t>(</a:t>
+            </a:r>
+            <a:r>
+              <a:rPr lang="en-US" dirty="0" err="1" smtClean="0"/>
+              <a:t>datastore</a:t>
+            </a:r>
+            <a:r>
+              <a:rPr lang="en-US" dirty="0" smtClean="0"/>
+              <a:t>, </a:t>
+            </a:r>
+            <a:r>
+              <a:rPr lang="en-US" dirty="0" err="1" smtClean="0"/>
+              <a:t>memcache</a:t>
+            </a:r>
+            <a:r>
+              <a:rPr lang="en-US" dirty="0" smtClean="0"/>
+              <a:t>, users, </a:t>
+            </a:r>
+            <a:r>
+              <a:rPr lang="en-US" dirty="0" err="1" smtClean="0"/>
+              <a:t>taskqueue</a:t>
+            </a:r>
+            <a:r>
+              <a:rPr lang="en-US" dirty="0" smtClean="0"/>
+              <a:t>…)</a:t>
+            </a:r>
+            <a:endParaRPr lang="en-US" dirty="0"/>
+          </a:p>
+        </p:txBody>
+      </p:sp>
+      <p:sp>
+        <p:nvSpPr>
+          <p:cNvPr id="12" name="Rectangle 11"/>
+          <p:cNvSpPr/>
+          <p:nvPr/>
+        </p:nvSpPr>
+        <p:spPr>
+          <a:xfrm>
+            <a:off x="2072105" y="3542620"/>
+            <a:ext cx="2219158" cy="1564105"/>
+          </a:xfrm>
+          <a:prstGeom prst="rect">
+            <a:avLst/>
+          </a:prstGeom>
+          <a:ln>
+            <a:noFill/>
+          </a:ln>
+        </p:spPr>
+        <p:style>
+          <a:lnRef idx="1">
+            <a:schemeClr val="accent1"/>
+          </a:lnRef>
+          <a:fillRef idx="3">
+            <a:schemeClr val="accent1"/>
+          </a:fillRef>
+          <a:effectRef idx="2">
+            <a:schemeClr val="accent1"/>
+          </a:effectRef>
+          <a:fontRef idx="minor">
+            <a:schemeClr val="lt1"/>
+          </a:fontRef>
+        </p:style>
+        <p:txBody>
+          <a:bodyPr rtlCol="0" anchor="ctr"/>
+          <a:lstStyle/>
+          <a:p>
+            <a:pPr algn="ctr"/>
+            <a:r>
+              <a:rPr lang="en-US" dirty="0" smtClean="0"/>
+              <a:t>Web Application</a:t>
+            </a:r>
+            <a:endParaRPr lang="en-US" dirty="0"/>
+          </a:p>
+        </p:txBody>
+      </p:sp>
+      <p:sp>
+        <p:nvSpPr>
+          <p:cNvPr id="13" name="Rectangle 12"/>
+          <p:cNvSpPr/>
+          <p:nvPr/>
+        </p:nvSpPr>
+        <p:spPr>
+          <a:xfrm>
+            <a:off x="4590716" y="3542620"/>
+            <a:ext cx="2219158" cy="1564105"/>
+          </a:xfrm>
+          <a:prstGeom prst="rect">
+            <a:avLst/>
+          </a:prstGeom>
+          <a:ln>
+            <a:noFill/>
+          </a:ln>
+        </p:spPr>
+        <p:style>
+          <a:lnRef idx="1">
+            <a:schemeClr val="accent1"/>
+          </a:lnRef>
+          <a:fillRef idx="3">
+            <a:schemeClr val="accent1"/>
+          </a:fillRef>
+          <a:effectRef idx="2">
+            <a:schemeClr val="accent1"/>
+          </a:effectRef>
+          <a:fontRef idx="minor">
+            <a:schemeClr val="lt1"/>
+          </a:fontRef>
+        </p:style>
+        <p:txBody>
+          <a:bodyPr rtlCol="0" anchor="ctr"/>
+          <a:lstStyle/>
+          <a:p>
+            <a:pPr algn="ctr"/>
+            <a:r>
+              <a:rPr lang="en-US" dirty="0" smtClean="0"/>
+              <a:t>Web Application</a:t>
+            </a:r>
+            <a:endParaRPr lang="en-US" dirty="0"/>
+          </a:p>
+        </p:txBody>
+      </p:sp>
+      <p:sp>
+        <p:nvSpPr>
+          <p:cNvPr id="14" name="Rectangle 13"/>
+          <p:cNvSpPr/>
+          <p:nvPr/>
+        </p:nvSpPr>
+        <p:spPr>
+          <a:xfrm>
+            <a:off x="2339465" y="3328725"/>
+            <a:ext cx="721894" cy="534737"/>
+          </a:xfrm>
+          <a:prstGeom prst="rect">
+            <a:avLst/>
+          </a:prstGeom>
+          <a:solidFill>
+            <a:srgbClr val="0000FF"/>
+          </a:solidFill>
+        </p:spPr>
+        <p:style>
+          <a:lnRef idx="1">
+            <a:schemeClr val="accent1"/>
+          </a:lnRef>
+          <a:fillRef idx="3">
+            <a:schemeClr val="accent1"/>
+          </a:fillRef>
+          <a:effectRef idx="2">
+            <a:schemeClr val="accent1"/>
+          </a:effectRef>
+          <a:fontRef idx="minor">
+            <a:schemeClr val="lt1"/>
+          </a:fontRef>
+        </p:style>
+        <p:txBody>
+          <a:bodyPr rtlCol="0" anchor="ctr"/>
+          <a:lstStyle/>
+          <a:p>
+            <a:pPr algn="ctr"/>
+            <a:r>
+              <a:rPr lang="en-US" dirty="0" smtClean="0"/>
+              <a:t>API</a:t>
+            </a:r>
+            <a:endParaRPr lang="en-US" dirty="0"/>
+          </a:p>
+        </p:txBody>
+      </p:sp>
+      <p:sp>
+        <p:nvSpPr>
+          <p:cNvPr id="15" name="Rectangle 14"/>
+          <p:cNvSpPr/>
+          <p:nvPr/>
+        </p:nvSpPr>
+        <p:spPr>
+          <a:xfrm>
+            <a:off x="3261886" y="3328725"/>
+            <a:ext cx="721894" cy="534737"/>
+          </a:xfrm>
+          <a:prstGeom prst="rect">
+            <a:avLst/>
+          </a:prstGeom>
+          <a:solidFill>
+            <a:srgbClr val="0000FF"/>
+          </a:solidFill>
+        </p:spPr>
+        <p:style>
+          <a:lnRef idx="1">
+            <a:schemeClr val="accent1"/>
+          </a:lnRef>
+          <a:fillRef idx="3">
+            <a:schemeClr val="accent1"/>
+          </a:fillRef>
+          <a:effectRef idx="2">
+            <a:schemeClr val="accent1"/>
+          </a:effectRef>
+          <a:fontRef idx="minor">
+            <a:schemeClr val="lt1"/>
+          </a:fontRef>
+        </p:style>
+        <p:txBody>
+          <a:bodyPr rtlCol="0" anchor="ctr"/>
+          <a:lstStyle/>
+          <a:p>
+            <a:pPr algn="ctr"/>
+            <a:r>
+              <a:rPr lang="en-US" dirty="0" smtClean="0"/>
+              <a:t>API</a:t>
+            </a:r>
+            <a:endParaRPr lang="en-US" dirty="0"/>
+          </a:p>
+        </p:txBody>
+      </p:sp>
+      <p:sp>
+        <p:nvSpPr>
+          <p:cNvPr id="17" name="Rectangle 16"/>
+          <p:cNvSpPr/>
+          <p:nvPr/>
+        </p:nvSpPr>
+        <p:spPr>
+          <a:xfrm>
+            <a:off x="5339348" y="3328725"/>
+            <a:ext cx="721894" cy="534737"/>
+          </a:xfrm>
+          <a:prstGeom prst="rect">
+            <a:avLst/>
+          </a:prstGeom>
+          <a:solidFill>
+            <a:srgbClr val="0000FF"/>
+          </a:solidFill>
+        </p:spPr>
+        <p:style>
+          <a:lnRef idx="1">
+            <a:schemeClr val="accent1"/>
+          </a:lnRef>
+          <a:fillRef idx="3">
+            <a:schemeClr val="accent1"/>
+          </a:fillRef>
+          <a:effectRef idx="2">
+            <a:schemeClr val="accent1"/>
+          </a:effectRef>
+          <a:fontRef idx="minor">
+            <a:schemeClr val="lt1"/>
+          </a:fontRef>
+        </p:style>
+        <p:txBody>
+          <a:bodyPr rtlCol="0" anchor="ctr"/>
+          <a:lstStyle/>
+          <a:p>
+            <a:pPr algn="ctr"/>
+            <a:r>
+              <a:rPr lang="en-US" dirty="0" smtClean="0"/>
+              <a:t>API</a:t>
+            </a:r>
+            <a:endParaRPr lang="en-US" dirty="0"/>
+          </a:p>
+        </p:txBody>
+      </p:sp>
+      <p:sp>
+        <p:nvSpPr>
+          <p:cNvPr id="19" name="Rectangle 18"/>
+          <p:cNvSpPr/>
+          <p:nvPr/>
+        </p:nvSpPr>
+        <p:spPr>
+          <a:xfrm>
+            <a:off x="2906287" y="307473"/>
+            <a:ext cx="2433061" cy="1203158"/>
+          </a:xfrm>
+          <a:prstGeom prst="rect">
+            <a:avLst/>
+          </a:prstGeom>
+          <a:solidFill>
+            <a:schemeClr val="tx2">
+              <a:lumMod val="40000"/>
+              <a:lumOff val="60000"/>
+            </a:schemeClr>
+          </a:solidFill>
+          <a:ln>
+            <a:noFill/>
+          </a:ln>
+        </p:spPr>
+        <p:style>
+          <a:lnRef idx="1">
+            <a:schemeClr val="accent1"/>
+          </a:lnRef>
+          <a:fillRef idx="3">
+            <a:schemeClr val="accent1"/>
+          </a:fillRef>
+          <a:effectRef idx="2">
+            <a:schemeClr val="accent1"/>
+          </a:effectRef>
+          <a:fontRef idx="minor">
+            <a:schemeClr val="lt1"/>
+          </a:fontRef>
+        </p:style>
+        <p:txBody>
+          <a:bodyPr rtlCol="0" anchor="ctr"/>
+          <a:lstStyle/>
+          <a:p>
+            <a:pPr algn="ctr"/>
+            <a:r>
+              <a:rPr lang="en-US" sz="1600" dirty="0" smtClean="0"/>
+              <a:t>External Application</a:t>
+            </a:r>
+          </a:p>
+          <a:p>
+            <a:pPr algn="ctr"/>
+            <a:r>
+              <a:rPr lang="en-US" sz="1600" dirty="0" smtClean="0"/>
+              <a:t>(Web, Mobile or Desktop)</a:t>
+            </a:r>
+            <a:endParaRPr lang="en-US" sz="1600" dirty="0"/>
+          </a:p>
+        </p:txBody>
+      </p:sp>
+      <p:cxnSp>
+        <p:nvCxnSpPr>
+          <p:cNvPr id="21" name="Elbow Connector 20"/>
+          <p:cNvCxnSpPr>
+            <a:stCxn id="19" idx="2"/>
+            <a:endCxn id="14" idx="0"/>
+          </p:cNvCxnSpPr>
+          <p:nvPr/>
+        </p:nvCxnSpPr>
+        <p:spPr>
+          <a:xfrm rot="5400000">
+            <a:off x="2502568" y="1708475"/>
+            <a:ext cx="1818094" cy="1422406"/>
+          </a:xfrm>
+          <a:prstGeom prst="bentConnector3">
+            <a:avLst/>
+          </a:prstGeom>
+          <a:ln>
+            <a:solidFill>
+              <a:schemeClr val="tx1"/>
+            </a:solidFill>
+            <a:tailEnd type="arrow"/>
+          </a:ln>
+        </p:spPr>
+        <p:style>
+          <a:lnRef idx="2">
+            <a:schemeClr val="accent1"/>
+          </a:lnRef>
+          <a:fillRef idx="0">
+            <a:schemeClr val="accent1"/>
+          </a:fillRef>
+          <a:effectRef idx="1">
+            <a:schemeClr val="accent1"/>
+          </a:effectRef>
+          <a:fontRef idx="minor">
+            <a:schemeClr val="tx1"/>
+          </a:fontRef>
+        </p:style>
+      </p:cxnSp>
+      <p:cxnSp>
+        <p:nvCxnSpPr>
+          <p:cNvPr id="23" name="Elbow Connector 22"/>
+          <p:cNvCxnSpPr>
+            <a:endCxn id="15" idx="0"/>
+          </p:cNvCxnSpPr>
+          <p:nvPr/>
+        </p:nvCxnSpPr>
+        <p:spPr>
+          <a:xfrm rot="10800000">
+            <a:off x="3622833" y="3328726"/>
+            <a:ext cx="1296746" cy="213895"/>
+          </a:xfrm>
+          <a:prstGeom prst="bentConnector4">
+            <a:avLst>
+              <a:gd name="adj1" fmla="val 1"/>
+              <a:gd name="adj2" fmla="val 206875"/>
+            </a:avLst>
+          </a:prstGeom>
+          <a:ln>
+            <a:solidFill>
+              <a:srgbClr val="000000"/>
+            </a:solidFill>
+            <a:tailEnd type="arrow"/>
+          </a:ln>
+        </p:spPr>
+        <p:style>
+          <a:lnRef idx="2">
+            <a:schemeClr val="accent1"/>
+          </a:lnRef>
+          <a:fillRef idx="0">
+            <a:schemeClr val="accent1"/>
+          </a:fillRef>
+          <a:effectRef idx="1">
+            <a:schemeClr val="accent1"/>
+          </a:effectRef>
+          <a:fontRef idx="minor">
+            <a:schemeClr val="tx1"/>
+          </a:fontRef>
+        </p:style>
+      </p:cxnSp>
+      <p:sp>
+        <p:nvSpPr>
+          <p:cNvPr id="25" name="TextBox 24"/>
+          <p:cNvSpPr txBox="1"/>
+          <p:nvPr/>
+        </p:nvSpPr>
+        <p:spPr>
+          <a:xfrm>
+            <a:off x="2999857" y="1994387"/>
+            <a:ext cx="435223" cy="369332"/>
+          </a:xfrm>
+          <a:prstGeom prst="rect">
+            <a:avLst/>
+          </a:prstGeom>
+          <a:noFill/>
+        </p:spPr>
+        <p:txBody>
+          <a:bodyPr wrap="none" rtlCol="0">
+            <a:spAutoFit/>
+          </a:bodyPr>
+          <a:lstStyle/>
+          <a:p>
+            <a:r>
+              <a:rPr lang="en-US" dirty="0" smtClean="0"/>
+              <a:t>(a)</a:t>
+            </a:r>
+            <a:endParaRPr lang="en-US" dirty="0"/>
+          </a:p>
+        </p:txBody>
+      </p:sp>
+      <p:sp>
+        <p:nvSpPr>
+          <p:cNvPr id="26" name="TextBox 25"/>
+          <p:cNvSpPr txBox="1"/>
+          <p:nvPr/>
+        </p:nvSpPr>
+        <p:spPr>
+          <a:xfrm>
+            <a:off x="4101415" y="2694892"/>
+            <a:ext cx="445930" cy="369332"/>
+          </a:xfrm>
+          <a:prstGeom prst="rect">
+            <a:avLst/>
+          </a:prstGeom>
+          <a:noFill/>
+        </p:spPr>
+        <p:txBody>
+          <a:bodyPr wrap="none" rtlCol="0">
+            <a:spAutoFit/>
+          </a:bodyPr>
+          <a:lstStyle/>
+          <a:p>
+            <a:r>
+              <a:rPr lang="en-US" dirty="0" smtClean="0"/>
+              <a:t>(b)</a:t>
+            </a:r>
+            <a:endParaRPr lang="en-US" dirty="0"/>
+          </a:p>
+        </p:txBody>
+      </p:sp>
+    </p:spTree>
+    <p:extLst>
+      <p:ext uri="{BB962C8B-B14F-4D97-AF65-F5344CB8AC3E}">
+        <p14:creationId xmlns:p14="http://schemas.microsoft.com/office/powerpoint/2010/main" val="3328039947"/>
+      </p:ext>
+    </p:extLst>
+  </p:cSld>
+  <p:clrMapOvr>
+    <a:masterClrMapping/>
+  </p:clrMapOvr>
 </p:sld>
 </file>
 

</xml_diff>

<commit_message>
reviewed up to results
</commit_message>
<xml_diff>
--- a/Eager/paper/oopsla/figures/FigureDesigns.pptx
+++ b/Eager/paper/oopsla/figures/FigureDesigns.pptx
@@ -289,7 +289,7 @@
           <a:p>
             <a:fld id="{5180D103-0C4C-A84A-B553-E839CDB1FABE}" type="datetimeFigureOut">
               <a:rPr lang="en-US" smtClean="0"/>
-              <a:t>3/19/15</a:t>
+              <a:t>3/21/15</a:t>
             </a:fld>
             <a:endParaRPr lang="en-US"/>
           </a:p>
@@ -459,7 +459,7 @@
           <a:p>
             <a:fld id="{5180D103-0C4C-A84A-B553-E839CDB1FABE}" type="datetimeFigureOut">
               <a:rPr lang="en-US" smtClean="0"/>
-              <a:t>3/19/15</a:t>
+              <a:t>3/21/15</a:t>
             </a:fld>
             <a:endParaRPr lang="en-US"/>
           </a:p>
@@ -639,7 +639,7 @@
           <a:p>
             <a:fld id="{5180D103-0C4C-A84A-B553-E839CDB1FABE}" type="datetimeFigureOut">
               <a:rPr lang="en-US" smtClean="0"/>
-              <a:t>3/19/15</a:t>
+              <a:t>3/21/15</a:t>
             </a:fld>
             <a:endParaRPr lang="en-US"/>
           </a:p>
@@ -809,7 +809,7 @@
           <a:p>
             <a:fld id="{5180D103-0C4C-A84A-B553-E839CDB1FABE}" type="datetimeFigureOut">
               <a:rPr lang="en-US" smtClean="0"/>
-              <a:t>3/19/15</a:t>
+              <a:t>3/21/15</a:t>
             </a:fld>
             <a:endParaRPr lang="en-US"/>
           </a:p>
@@ -1055,7 +1055,7 @@
           <a:p>
             <a:fld id="{5180D103-0C4C-A84A-B553-E839CDB1FABE}" type="datetimeFigureOut">
               <a:rPr lang="en-US" smtClean="0"/>
-              <a:t>3/19/15</a:t>
+              <a:t>3/21/15</a:t>
             </a:fld>
             <a:endParaRPr lang="en-US"/>
           </a:p>
@@ -1343,7 +1343,7 @@
           <a:p>
             <a:fld id="{5180D103-0C4C-A84A-B553-E839CDB1FABE}" type="datetimeFigureOut">
               <a:rPr lang="en-US" smtClean="0"/>
-              <a:t>3/19/15</a:t>
+              <a:t>3/21/15</a:t>
             </a:fld>
             <a:endParaRPr lang="en-US"/>
           </a:p>
@@ -1765,7 +1765,7 @@
           <a:p>
             <a:fld id="{5180D103-0C4C-A84A-B553-E839CDB1FABE}" type="datetimeFigureOut">
               <a:rPr lang="en-US" smtClean="0"/>
-              <a:t>3/19/15</a:t>
+              <a:t>3/21/15</a:t>
             </a:fld>
             <a:endParaRPr lang="en-US"/>
           </a:p>
@@ -1883,7 +1883,7 @@
           <a:p>
             <a:fld id="{5180D103-0C4C-A84A-B553-E839CDB1FABE}" type="datetimeFigureOut">
               <a:rPr lang="en-US" smtClean="0"/>
-              <a:t>3/19/15</a:t>
+              <a:t>3/21/15</a:t>
             </a:fld>
             <a:endParaRPr lang="en-US"/>
           </a:p>
@@ -1978,7 +1978,7 @@
           <a:p>
             <a:fld id="{5180D103-0C4C-A84A-B553-E839CDB1FABE}" type="datetimeFigureOut">
               <a:rPr lang="en-US" smtClean="0"/>
-              <a:t>3/19/15</a:t>
+              <a:t>3/21/15</a:t>
             </a:fld>
             <a:endParaRPr lang="en-US"/>
           </a:p>
@@ -2255,7 +2255,7 @@
           <a:p>
             <a:fld id="{5180D103-0C4C-A84A-B553-E839CDB1FABE}" type="datetimeFigureOut">
               <a:rPr lang="en-US" smtClean="0"/>
-              <a:t>3/19/15</a:t>
+              <a:t>3/21/15</a:t>
             </a:fld>
             <a:endParaRPr lang="en-US"/>
           </a:p>
@@ -2508,7 +2508,7 @@
           <a:p>
             <a:fld id="{5180D103-0C4C-A84A-B553-E839CDB1FABE}" type="datetimeFigureOut">
               <a:rPr lang="en-US" smtClean="0"/>
-              <a:t>3/19/15</a:t>
+              <a:t>3/21/15</a:t>
             </a:fld>
             <a:endParaRPr lang="en-US"/>
           </a:p>
@@ -2721,7 +2721,7 @@
           <a:p>
             <a:fld id="{5180D103-0C4C-A84A-B553-E839CDB1FABE}" type="datetimeFigureOut">
               <a:rPr lang="en-US" smtClean="0"/>
-              <a:t>3/19/15</a:t>
+              <a:t>3/21/15</a:t>
             </a:fld>
             <a:endParaRPr lang="en-US"/>
           </a:p>
@@ -3656,7 +3656,7 @@
       </p:grpSpPr>
       <p:grpSp>
         <p:nvGrpSpPr>
-          <p:cNvPr id="27" name="Group 26"/>
+          <p:cNvPr id="4" name="Group 3"/>
           <p:cNvGrpSpPr/>
           <p:nvPr/>
         </p:nvGrpSpPr>
@@ -3664,465 +3664,593 @@
           <a:xfrm>
             <a:off x="307474" y="40913"/>
             <a:ext cx="8582526" cy="6817087"/>
-            <a:chOff x="307474" y="307473"/>
+            <a:chOff x="307474" y="40913"/>
             <a:chExt cx="8582526" cy="6817087"/>
           </a:xfrm>
         </p:grpSpPr>
+        <p:grpSp>
+          <p:nvGrpSpPr>
+            <p:cNvPr id="27" name="Group 26"/>
+            <p:cNvGrpSpPr/>
+            <p:nvPr/>
+          </p:nvGrpSpPr>
+          <p:grpSpPr>
+            <a:xfrm>
+              <a:off x="307474" y="40913"/>
+              <a:ext cx="8582526" cy="6817087"/>
+              <a:chOff x="307474" y="307473"/>
+              <a:chExt cx="8582526" cy="6817087"/>
+            </a:xfrm>
+          </p:grpSpPr>
+          <p:sp>
+            <p:nvSpPr>
+              <p:cNvPr id="18" name="Cloud 17"/>
+              <p:cNvSpPr/>
+              <p:nvPr/>
+            </p:nvSpPr>
+            <p:spPr>
+              <a:xfrm>
+                <a:off x="307474" y="2179053"/>
+                <a:ext cx="8582526" cy="4945507"/>
+              </a:xfrm>
+              <a:prstGeom prst="cloud">
+                <a:avLst/>
+              </a:prstGeom>
+              <a:solidFill>
+                <a:schemeClr val="bg1">
+                  <a:lumMod val="75000"/>
+                </a:schemeClr>
+              </a:solidFill>
+              <a:ln>
+                <a:noFill/>
+              </a:ln>
+            </p:spPr>
+            <p:style>
+              <a:lnRef idx="1">
+                <a:schemeClr val="accent1"/>
+              </a:lnRef>
+              <a:fillRef idx="3">
+                <a:schemeClr val="accent1"/>
+              </a:fillRef>
+              <a:effectRef idx="2">
+                <a:schemeClr val="accent1"/>
+              </a:effectRef>
+              <a:fontRef idx="minor">
+                <a:schemeClr val="lt1"/>
+              </a:fontRef>
+            </p:style>
+            <p:txBody>
+              <a:bodyPr rtlCol="0" anchor="ctr"/>
+              <a:lstStyle/>
+              <a:p>
+                <a:pPr algn="ctr"/>
+                <a:endParaRPr lang="en-US"/>
+              </a:p>
+            </p:txBody>
+          </p:sp>
+          <p:sp>
+            <p:nvSpPr>
+              <p:cNvPr id="5" name="Rectangle 4"/>
+              <p:cNvSpPr/>
+              <p:nvPr/>
+            </p:nvSpPr>
+            <p:spPr>
+              <a:xfrm>
+                <a:off x="1630949" y="5120105"/>
+                <a:ext cx="5641472" cy="1243264"/>
+              </a:xfrm>
+              <a:prstGeom prst="rect">
+                <a:avLst/>
+              </a:prstGeom>
+              <a:ln>
+                <a:noFill/>
+              </a:ln>
+            </p:spPr>
+            <p:style>
+              <a:lnRef idx="2">
+                <a:schemeClr val="accent2">
+                  <a:shade val="50000"/>
+                </a:schemeClr>
+              </a:lnRef>
+              <a:fillRef idx="1">
+                <a:schemeClr val="accent2"/>
+              </a:fillRef>
+              <a:effectRef idx="0">
+                <a:schemeClr val="accent2"/>
+              </a:effectRef>
+              <a:fontRef idx="minor">
+                <a:schemeClr val="lt1"/>
+              </a:fontRef>
+            </p:style>
+            <p:txBody>
+              <a:bodyPr rtlCol="0" anchor="ctr"/>
+              <a:lstStyle/>
+              <a:p>
+                <a:pPr algn="ctr"/>
+                <a:r>
+                  <a:rPr lang="en-US" sz="2200" dirty="0" smtClean="0"/>
+                  <a:t>Cloud SDK Interfaces and Scalable </a:t>
+                </a:r>
+              </a:p>
+              <a:p>
+                <a:pPr algn="ctr"/>
+                <a:r>
+                  <a:rPr lang="en-US" sz="2200" dirty="0" smtClean="0"/>
+                  <a:t>Service Implementations</a:t>
+                </a:r>
+              </a:p>
+              <a:p>
+                <a:pPr algn="ctr"/>
+                <a:r>
+                  <a:rPr lang="en-US" sz="2200" dirty="0" smtClean="0"/>
+                  <a:t>(</a:t>
+                </a:r>
+                <a:r>
+                  <a:rPr lang="en-US" sz="2200" dirty="0" err="1" smtClean="0"/>
+                  <a:t>datastore</a:t>
+                </a:r>
+                <a:r>
+                  <a:rPr lang="en-US" sz="2200" dirty="0" smtClean="0"/>
+                  <a:t>, </a:t>
+                </a:r>
+                <a:r>
+                  <a:rPr lang="en-US" sz="2200" dirty="0" err="1" smtClean="0"/>
+                  <a:t>memcache</a:t>
+                </a:r>
+                <a:r>
+                  <a:rPr lang="en-US" sz="2200" dirty="0" smtClean="0"/>
+                  <a:t>, users, </a:t>
+                </a:r>
+                <a:r>
+                  <a:rPr lang="en-US" sz="2200" dirty="0" err="1" smtClean="0"/>
+                  <a:t>taskqueue</a:t>
+                </a:r>
+                <a:r>
+                  <a:rPr lang="en-US" sz="2200" dirty="0" smtClean="0"/>
+                  <a:t>…)</a:t>
+                </a:r>
+                <a:endParaRPr lang="en-US" sz="2200" dirty="0"/>
+              </a:p>
+            </p:txBody>
+          </p:sp>
+          <p:sp>
+            <p:nvSpPr>
+              <p:cNvPr id="12" name="Rectangle 11"/>
+              <p:cNvSpPr/>
+              <p:nvPr/>
+            </p:nvSpPr>
+            <p:spPr>
+              <a:xfrm>
+                <a:off x="2072105" y="3542620"/>
+                <a:ext cx="2219158" cy="1564105"/>
+              </a:xfrm>
+              <a:prstGeom prst="rect">
+                <a:avLst/>
+              </a:prstGeom>
+              <a:ln>
+                <a:noFill/>
+              </a:ln>
+            </p:spPr>
+            <p:style>
+              <a:lnRef idx="1">
+                <a:schemeClr val="accent1"/>
+              </a:lnRef>
+              <a:fillRef idx="3">
+                <a:schemeClr val="accent1"/>
+              </a:fillRef>
+              <a:effectRef idx="2">
+                <a:schemeClr val="accent1"/>
+              </a:effectRef>
+              <a:fontRef idx="minor">
+                <a:schemeClr val="lt1"/>
+              </a:fontRef>
+            </p:style>
+            <p:txBody>
+              <a:bodyPr rtlCol="0" anchor="ctr"/>
+              <a:lstStyle/>
+              <a:p>
+                <a:pPr algn="ctr"/>
+                <a:r>
+                  <a:rPr lang="en-US" sz="2200" dirty="0" smtClean="0"/>
+                  <a:t>Web Application</a:t>
+                </a:r>
+                <a:endParaRPr lang="en-US" sz="2200" dirty="0"/>
+              </a:p>
+            </p:txBody>
+          </p:sp>
+          <p:sp>
+            <p:nvSpPr>
+              <p:cNvPr id="13" name="Rectangle 12"/>
+              <p:cNvSpPr/>
+              <p:nvPr/>
+            </p:nvSpPr>
+            <p:spPr>
+              <a:xfrm>
+                <a:off x="4590716" y="3542620"/>
+                <a:ext cx="2219158" cy="1564105"/>
+              </a:xfrm>
+              <a:prstGeom prst="rect">
+                <a:avLst/>
+              </a:prstGeom>
+              <a:ln>
+                <a:noFill/>
+              </a:ln>
+            </p:spPr>
+            <p:style>
+              <a:lnRef idx="1">
+                <a:schemeClr val="accent1"/>
+              </a:lnRef>
+              <a:fillRef idx="3">
+                <a:schemeClr val="accent1"/>
+              </a:fillRef>
+              <a:effectRef idx="2">
+                <a:schemeClr val="accent1"/>
+              </a:effectRef>
+              <a:fontRef idx="minor">
+                <a:schemeClr val="lt1"/>
+              </a:fontRef>
+            </p:style>
+            <p:txBody>
+              <a:bodyPr rtlCol="0" anchor="ctr"/>
+              <a:lstStyle/>
+              <a:p>
+                <a:pPr algn="ctr"/>
+                <a:r>
+                  <a:rPr lang="en-US" sz="2200" dirty="0" smtClean="0"/>
+                  <a:t>Web Application</a:t>
+                </a:r>
+                <a:endParaRPr lang="en-US" sz="2200" dirty="0"/>
+              </a:p>
+            </p:txBody>
+          </p:sp>
+          <p:sp>
+            <p:nvSpPr>
+              <p:cNvPr id="14" name="Rectangle 13"/>
+              <p:cNvSpPr/>
+              <p:nvPr/>
+            </p:nvSpPr>
+            <p:spPr>
+              <a:xfrm>
+                <a:off x="2339465" y="3328725"/>
+                <a:ext cx="721894" cy="534737"/>
+              </a:xfrm>
+              <a:prstGeom prst="rect">
+                <a:avLst/>
+              </a:prstGeom>
+              <a:solidFill>
+                <a:srgbClr val="0000FF"/>
+              </a:solidFill>
+            </p:spPr>
+            <p:style>
+              <a:lnRef idx="1">
+                <a:schemeClr val="accent1"/>
+              </a:lnRef>
+              <a:fillRef idx="3">
+                <a:schemeClr val="accent1"/>
+              </a:fillRef>
+              <a:effectRef idx="2">
+                <a:schemeClr val="accent1"/>
+              </a:effectRef>
+              <a:fontRef idx="minor">
+                <a:schemeClr val="lt1"/>
+              </a:fontRef>
+            </p:style>
+            <p:txBody>
+              <a:bodyPr rtlCol="0" anchor="ctr"/>
+              <a:lstStyle/>
+              <a:p>
+                <a:pPr algn="ctr"/>
+                <a:r>
+                  <a:rPr lang="en-US" sz="1600" dirty="0" smtClean="0"/>
+                  <a:t>Web API</a:t>
+                </a:r>
+                <a:endParaRPr lang="en-US" sz="1600" dirty="0"/>
+              </a:p>
+            </p:txBody>
+          </p:sp>
+          <p:sp>
+            <p:nvSpPr>
+              <p:cNvPr id="15" name="Rectangle 14"/>
+              <p:cNvSpPr/>
+              <p:nvPr/>
+            </p:nvSpPr>
+            <p:spPr>
+              <a:xfrm>
+                <a:off x="3261886" y="3328725"/>
+                <a:ext cx="721894" cy="534737"/>
+              </a:xfrm>
+              <a:prstGeom prst="rect">
+                <a:avLst/>
+              </a:prstGeom>
+              <a:solidFill>
+                <a:srgbClr val="0000FF"/>
+              </a:solidFill>
+            </p:spPr>
+            <p:style>
+              <a:lnRef idx="1">
+                <a:schemeClr val="accent1"/>
+              </a:lnRef>
+              <a:fillRef idx="3">
+                <a:schemeClr val="accent1"/>
+              </a:fillRef>
+              <a:effectRef idx="2">
+                <a:schemeClr val="accent1"/>
+              </a:effectRef>
+              <a:fontRef idx="minor">
+                <a:schemeClr val="lt1"/>
+              </a:fontRef>
+            </p:style>
+            <p:txBody>
+              <a:bodyPr rtlCol="0" anchor="ctr"/>
+              <a:lstStyle/>
+              <a:p>
+                <a:pPr algn="ctr"/>
+                <a:r>
+                  <a:rPr lang="en-US" sz="1600" dirty="0" smtClean="0"/>
+                  <a:t>Web API</a:t>
+                </a:r>
+                <a:endParaRPr lang="en-US" sz="1600" dirty="0"/>
+              </a:p>
+            </p:txBody>
+          </p:sp>
+          <p:sp>
+            <p:nvSpPr>
+              <p:cNvPr id="17" name="Rectangle 16"/>
+              <p:cNvSpPr/>
+              <p:nvPr/>
+            </p:nvSpPr>
+            <p:spPr>
+              <a:xfrm>
+                <a:off x="5339348" y="3328725"/>
+                <a:ext cx="721894" cy="534737"/>
+              </a:xfrm>
+              <a:prstGeom prst="rect">
+                <a:avLst/>
+              </a:prstGeom>
+              <a:solidFill>
+                <a:srgbClr val="0000FF"/>
+              </a:solidFill>
+            </p:spPr>
+            <p:style>
+              <a:lnRef idx="1">
+                <a:schemeClr val="accent1"/>
+              </a:lnRef>
+              <a:fillRef idx="3">
+                <a:schemeClr val="accent1"/>
+              </a:fillRef>
+              <a:effectRef idx="2">
+                <a:schemeClr val="accent1"/>
+              </a:effectRef>
+              <a:fontRef idx="minor">
+                <a:schemeClr val="lt1"/>
+              </a:fontRef>
+            </p:style>
+            <p:txBody>
+              <a:bodyPr rtlCol="0" anchor="ctr"/>
+              <a:lstStyle/>
+              <a:p>
+                <a:pPr algn="ctr"/>
+                <a:r>
+                  <a:rPr lang="en-US" sz="1600" dirty="0" smtClean="0"/>
+                  <a:t>Web API</a:t>
+                </a:r>
+                <a:endParaRPr lang="en-US" sz="1600" dirty="0"/>
+              </a:p>
+            </p:txBody>
+          </p:sp>
+          <p:sp>
+            <p:nvSpPr>
+              <p:cNvPr id="19" name="Rectangle 18"/>
+              <p:cNvSpPr/>
+              <p:nvPr/>
+            </p:nvSpPr>
+            <p:spPr>
+              <a:xfrm>
+                <a:off x="2906287" y="307473"/>
+                <a:ext cx="2433061" cy="1203158"/>
+              </a:xfrm>
+              <a:prstGeom prst="rect">
+                <a:avLst/>
+              </a:prstGeom>
+              <a:solidFill>
+                <a:schemeClr val="tx2">
+                  <a:lumMod val="40000"/>
+                  <a:lumOff val="60000"/>
+                </a:schemeClr>
+              </a:solidFill>
+              <a:ln>
+                <a:noFill/>
+              </a:ln>
+            </p:spPr>
+            <p:style>
+              <a:lnRef idx="1">
+                <a:schemeClr val="accent1"/>
+              </a:lnRef>
+              <a:fillRef idx="3">
+                <a:schemeClr val="accent1"/>
+              </a:fillRef>
+              <a:effectRef idx="2">
+                <a:schemeClr val="accent1"/>
+              </a:effectRef>
+              <a:fontRef idx="minor">
+                <a:schemeClr val="lt1"/>
+              </a:fontRef>
+            </p:style>
+            <p:txBody>
+              <a:bodyPr rtlCol="0" anchor="ctr"/>
+              <a:lstStyle/>
+              <a:p>
+                <a:pPr algn="ctr"/>
+                <a:r>
+                  <a:rPr lang="en-US" sz="2000" dirty="0" smtClean="0"/>
+                  <a:t>External Client</a:t>
+                </a:r>
+              </a:p>
+              <a:p>
+                <a:pPr algn="ctr"/>
+                <a:r>
+                  <a:rPr lang="en-US" sz="2000" dirty="0" smtClean="0"/>
+                  <a:t>(Web, Mobile or Desktop application/web API)</a:t>
+                </a:r>
+                <a:endParaRPr lang="en-US" sz="2000" dirty="0"/>
+              </a:p>
+            </p:txBody>
+          </p:sp>
+          <p:cxnSp>
+            <p:nvCxnSpPr>
+              <p:cNvPr id="21" name="Elbow Connector 20"/>
+              <p:cNvCxnSpPr>
+                <a:stCxn id="19" idx="2"/>
+                <a:endCxn id="14" idx="0"/>
+              </p:cNvCxnSpPr>
+              <p:nvPr/>
+            </p:nvCxnSpPr>
+            <p:spPr>
+              <a:xfrm rot="5400000">
+                <a:off x="2502568" y="1708475"/>
+                <a:ext cx="1818094" cy="1422406"/>
+              </a:xfrm>
+              <a:prstGeom prst="bentConnector3">
+                <a:avLst/>
+              </a:prstGeom>
+              <a:ln>
+                <a:solidFill>
+                  <a:schemeClr val="tx1"/>
+                </a:solidFill>
+                <a:tailEnd type="arrow"/>
+              </a:ln>
+            </p:spPr>
+            <p:style>
+              <a:lnRef idx="2">
+                <a:schemeClr val="accent1"/>
+              </a:lnRef>
+              <a:fillRef idx="0">
+                <a:schemeClr val="accent1"/>
+              </a:fillRef>
+              <a:effectRef idx="1">
+                <a:schemeClr val="accent1"/>
+              </a:effectRef>
+              <a:fontRef idx="minor">
+                <a:schemeClr val="tx1"/>
+              </a:fontRef>
+            </p:style>
+          </p:cxnSp>
+          <p:cxnSp>
+            <p:nvCxnSpPr>
+              <p:cNvPr id="23" name="Elbow Connector 22"/>
+              <p:cNvCxnSpPr>
+                <a:endCxn id="15" idx="0"/>
+              </p:cNvCxnSpPr>
+              <p:nvPr/>
+            </p:nvCxnSpPr>
+            <p:spPr>
+              <a:xfrm rot="10800000">
+                <a:off x="3622833" y="3328726"/>
+                <a:ext cx="1296746" cy="213895"/>
+              </a:xfrm>
+              <a:prstGeom prst="bentConnector4">
+                <a:avLst>
+                  <a:gd name="adj1" fmla="val 1"/>
+                  <a:gd name="adj2" fmla="val 206875"/>
+                </a:avLst>
+              </a:prstGeom>
+              <a:ln>
+                <a:solidFill>
+                  <a:srgbClr val="000000"/>
+                </a:solidFill>
+                <a:tailEnd type="arrow"/>
+              </a:ln>
+            </p:spPr>
+            <p:style>
+              <a:lnRef idx="2">
+                <a:schemeClr val="accent1"/>
+              </a:lnRef>
+              <a:fillRef idx="0">
+                <a:schemeClr val="accent1"/>
+              </a:fillRef>
+              <a:effectRef idx="1">
+                <a:schemeClr val="accent1"/>
+              </a:effectRef>
+              <a:fontRef idx="minor">
+                <a:schemeClr val="tx1"/>
+              </a:fontRef>
+            </p:style>
+          </p:cxnSp>
+          <p:sp>
+            <p:nvSpPr>
+              <p:cNvPr id="25" name="TextBox 24"/>
+              <p:cNvSpPr txBox="1"/>
+              <p:nvPr/>
+            </p:nvSpPr>
+            <p:spPr>
+              <a:xfrm>
+                <a:off x="2999857" y="1994387"/>
+                <a:ext cx="463062" cy="400110"/>
+              </a:xfrm>
+              <a:prstGeom prst="rect">
+                <a:avLst/>
+              </a:prstGeom>
+              <a:noFill/>
+            </p:spPr>
+            <p:txBody>
+              <a:bodyPr wrap="none" rtlCol="0">
+                <a:spAutoFit/>
+              </a:bodyPr>
+              <a:lstStyle/>
+              <a:p>
+                <a:r>
+                  <a:rPr lang="en-US" sz="2000" dirty="0" smtClean="0"/>
+                  <a:t>(a)</a:t>
+                </a:r>
+                <a:endParaRPr lang="en-US" sz="2000" dirty="0"/>
+              </a:p>
+            </p:txBody>
+          </p:sp>
+          <p:sp>
+            <p:nvSpPr>
+              <p:cNvPr id="26" name="TextBox 25"/>
+              <p:cNvSpPr txBox="1"/>
+              <p:nvPr/>
+            </p:nvSpPr>
+            <p:spPr>
+              <a:xfrm>
+                <a:off x="4101415" y="2694892"/>
+                <a:ext cx="474960" cy="400110"/>
+              </a:xfrm>
+              <a:prstGeom prst="rect">
+                <a:avLst/>
+              </a:prstGeom>
+              <a:noFill/>
+            </p:spPr>
+            <p:txBody>
+              <a:bodyPr wrap="none" rtlCol="0">
+                <a:spAutoFit/>
+              </a:bodyPr>
+              <a:lstStyle/>
+              <a:p>
+                <a:r>
+                  <a:rPr lang="en-US" sz="2000" dirty="0" smtClean="0"/>
+                  <a:t>(b)</a:t>
+                </a:r>
+                <a:endParaRPr lang="en-US" sz="2000" dirty="0"/>
+              </a:p>
+            </p:txBody>
+          </p:sp>
+        </p:grpSp>
         <p:sp>
           <p:nvSpPr>
-            <p:cNvPr id="18" name="Cloud 17"/>
+            <p:cNvPr id="2" name="Right Brace 1"/>
             <p:cNvSpPr/>
             <p:nvPr/>
           </p:nvSpPr>
           <p:spPr>
             <a:xfrm>
-              <a:off x="307474" y="2179053"/>
-              <a:ext cx="8582526" cy="4945507"/>
+              <a:off x="6809874" y="2916463"/>
+              <a:ext cx="462547" cy="1937082"/>
             </a:xfrm>
-            <a:prstGeom prst="cloud">
+            <a:prstGeom prst="rightBrace">
               <a:avLst/>
             </a:prstGeom>
-            <a:solidFill>
-              <a:schemeClr val="bg1">
-                <a:lumMod val="75000"/>
-              </a:schemeClr>
-            </a:solidFill>
-            <a:ln>
-              <a:noFill/>
-            </a:ln>
-          </p:spPr>
-          <p:style>
-            <a:lnRef idx="1">
-              <a:schemeClr val="accent1"/>
-            </a:lnRef>
-            <a:fillRef idx="3">
-              <a:schemeClr val="accent1"/>
-            </a:fillRef>
-            <a:effectRef idx="2">
-              <a:schemeClr val="accent1"/>
-            </a:effectRef>
-            <a:fontRef idx="minor">
-              <a:schemeClr val="lt1"/>
-            </a:fontRef>
-          </p:style>
-          <p:txBody>
-            <a:bodyPr rtlCol="0" anchor="ctr"/>
-            <a:lstStyle/>
-            <a:p>
-              <a:pPr algn="ctr"/>
-              <a:endParaRPr lang="en-US"/>
-            </a:p>
-          </p:txBody>
-        </p:sp>
-        <p:sp>
-          <p:nvSpPr>
-            <p:cNvPr id="5" name="Rectangle 4"/>
-            <p:cNvSpPr/>
-            <p:nvPr/>
-          </p:nvSpPr>
-          <p:spPr>
-            <a:xfrm>
-              <a:off x="1630949" y="5120105"/>
-              <a:ext cx="5641472" cy="1243264"/>
-            </a:xfrm>
-            <a:prstGeom prst="rect">
-              <a:avLst/>
-            </a:prstGeom>
-            <a:ln>
-              <a:noFill/>
-            </a:ln>
-          </p:spPr>
-          <p:style>
-            <a:lnRef idx="2">
-              <a:schemeClr val="accent2">
-                <a:shade val="50000"/>
-              </a:schemeClr>
-            </a:lnRef>
-            <a:fillRef idx="1">
-              <a:schemeClr val="accent2"/>
-            </a:fillRef>
-            <a:effectRef idx="0">
-              <a:schemeClr val="accent2"/>
-            </a:effectRef>
-            <a:fontRef idx="minor">
-              <a:schemeClr val="lt1"/>
-            </a:fontRef>
-          </p:style>
-          <p:txBody>
-            <a:bodyPr rtlCol="0" anchor="ctr"/>
-            <a:lstStyle/>
-            <a:p>
-              <a:pPr algn="ctr"/>
-              <a:r>
-                <a:rPr lang="en-US" sz="2200" dirty="0" smtClean="0"/>
-                <a:t>Cloud </a:t>
-              </a:r>
-              <a:r>
-                <a:rPr lang="en-US" sz="2200" dirty="0" smtClean="0"/>
-                <a:t>SDK Interfaces and Scalable </a:t>
-              </a:r>
-            </a:p>
-            <a:p>
-              <a:pPr algn="ctr"/>
-              <a:r>
-                <a:rPr lang="en-US" sz="2200" dirty="0" smtClean="0"/>
-                <a:t>Service Implementations</a:t>
-              </a:r>
-              <a:endParaRPr lang="en-US" sz="2200" dirty="0" smtClean="0"/>
-            </a:p>
-            <a:p>
-              <a:pPr algn="ctr"/>
-              <a:r>
-                <a:rPr lang="en-US" sz="2200" dirty="0" smtClean="0"/>
-                <a:t>(</a:t>
-              </a:r>
-              <a:r>
-                <a:rPr lang="en-US" sz="2200" dirty="0" err="1" smtClean="0"/>
-                <a:t>datastore</a:t>
-              </a:r>
-              <a:r>
-                <a:rPr lang="en-US" sz="2200" dirty="0" smtClean="0"/>
-                <a:t>, </a:t>
-              </a:r>
-              <a:r>
-                <a:rPr lang="en-US" sz="2200" dirty="0" err="1" smtClean="0"/>
-                <a:t>memcache</a:t>
-              </a:r>
-              <a:r>
-                <a:rPr lang="en-US" sz="2200" dirty="0" smtClean="0"/>
-                <a:t>, users, </a:t>
-              </a:r>
-              <a:r>
-                <a:rPr lang="en-US" sz="2200" dirty="0" err="1" smtClean="0"/>
-                <a:t>taskqueue</a:t>
-              </a:r>
-              <a:r>
-                <a:rPr lang="en-US" sz="2200" dirty="0" smtClean="0"/>
-                <a:t>…)</a:t>
-              </a:r>
-              <a:endParaRPr lang="en-US" sz="2200" dirty="0"/>
-            </a:p>
-          </p:txBody>
-        </p:sp>
-        <p:sp>
-          <p:nvSpPr>
-            <p:cNvPr id="12" name="Rectangle 11"/>
-            <p:cNvSpPr/>
-            <p:nvPr/>
-          </p:nvSpPr>
-          <p:spPr>
-            <a:xfrm>
-              <a:off x="2072105" y="3542620"/>
-              <a:ext cx="2219158" cy="1564105"/>
-            </a:xfrm>
-            <a:prstGeom prst="rect">
-              <a:avLst/>
-            </a:prstGeom>
-            <a:ln>
-              <a:noFill/>
-            </a:ln>
-          </p:spPr>
-          <p:style>
-            <a:lnRef idx="1">
-              <a:schemeClr val="accent1"/>
-            </a:lnRef>
-            <a:fillRef idx="3">
-              <a:schemeClr val="accent1"/>
-            </a:fillRef>
-            <a:effectRef idx="2">
-              <a:schemeClr val="accent1"/>
-            </a:effectRef>
-            <a:fontRef idx="minor">
-              <a:schemeClr val="lt1"/>
-            </a:fontRef>
-          </p:style>
-          <p:txBody>
-            <a:bodyPr rtlCol="0" anchor="ctr"/>
-            <a:lstStyle/>
-            <a:p>
-              <a:pPr algn="ctr"/>
-              <a:r>
-                <a:rPr lang="en-US" sz="2200" dirty="0" smtClean="0"/>
-                <a:t>Web </a:t>
-              </a:r>
-              <a:r>
-                <a:rPr lang="en-US" sz="2200" dirty="0" smtClean="0"/>
-                <a:t>Application</a:t>
-              </a:r>
-              <a:endParaRPr lang="en-US" sz="2200" dirty="0"/>
-            </a:p>
-          </p:txBody>
-        </p:sp>
-        <p:sp>
-          <p:nvSpPr>
-            <p:cNvPr id="13" name="Rectangle 12"/>
-            <p:cNvSpPr/>
-            <p:nvPr/>
-          </p:nvSpPr>
-          <p:spPr>
-            <a:xfrm>
-              <a:off x="4590716" y="3542620"/>
-              <a:ext cx="2219158" cy="1564105"/>
-            </a:xfrm>
-            <a:prstGeom prst="rect">
-              <a:avLst/>
-            </a:prstGeom>
-            <a:ln>
-              <a:noFill/>
-            </a:ln>
-          </p:spPr>
-          <p:style>
-            <a:lnRef idx="1">
-              <a:schemeClr val="accent1"/>
-            </a:lnRef>
-            <a:fillRef idx="3">
-              <a:schemeClr val="accent1"/>
-            </a:fillRef>
-            <a:effectRef idx="2">
-              <a:schemeClr val="accent1"/>
-            </a:effectRef>
-            <a:fontRef idx="minor">
-              <a:schemeClr val="lt1"/>
-            </a:fontRef>
-          </p:style>
-          <p:txBody>
-            <a:bodyPr rtlCol="0" anchor="ctr"/>
-            <a:lstStyle/>
-            <a:p>
-              <a:pPr algn="ctr"/>
-              <a:r>
-                <a:rPr lang="en-US" sz="2200" dirty="0" smtClean="0"/>
-                <a:t>Web Application</a:t>
-              </a:r>
-              <a:endParaRPr lang="en-US" sz="2200" dirty="0"/>
-            </a:p>
-          </p:txBody>
-        </p:sp>
-        <p:sp>
-          <p:nvSpPr>
-            <p:cNvPr id="14" name="Rectangle 13"/>
-            <p:cNvSpPr/>
-            <p:nvPr/>
-          </p:nvSpPr>
-          <p:spPr>
-            <a:xfrm>
-              <a:off x="2339465" y="3328725"/>
-              <a:ext cx="721894" cy="534737"/>
-            </a:xfrm>
-            <a:prstGeom prst="rect">
-              <a:avLst/>
-            </a:prstGeom>
-            <a:solidFill>
-              <a:srgbClr val="0000FF"/>
-            </a:solidFill>
-          </p:spPr>
-          <p:style>
-            <a:lnRef idx="1">
-              <a:schemeClr val="accent1"/>
-            </a:lnRef>
-            <a:fillRef idx="3">
-              <a:schemeClr val="accent1"/>
-            </a:fillRef>
-            <a:effectRef idx="2">
-              <a:schemeClr val="accent1"/>
-            </a:effectRef>
-            <a:fontRef idx="minor">
-              <a:schemeClr val="lt1"/>
-            </a:fontRef>
-          </p:style>
-          <p:txBody>
-            <a:bodyPr rtlCol="0" anchor="ctr"/>
-            <a:lstStyle/>
-            <a:p>
-              <a:pPr algn="ctr"/>
-              <a:r>
-                <a:rPr lang="en-US" sz="2400" dirty="0" smtClean="0"/>
-                <a:t>API</a:t>
-              </a:r>
-              <a:endParaRPr lang="en-US" sz="2400" dirty="0"/>
-            </a:p>
-          </p:txBody>
-        </p:sp>
-        <p:sp>
-          <p:nvSpPr>
-            <p:cNvPr id="15" name="Rectangle 14"/>
-            <p:cNvSpPr/>
-            <p:nvPr/>
-          </p:nvSpPr>
-          <p:spPr>
-            <a:xfrm>
-              <a:off x="3261886" y="3328725"/>
-              <a:ext cx="721894" cy="534737"/>
-            </a:xfrm>
-            <a:prstGeom prst="rect">
-              <a:avLst/>
-            </a:prstGeom>
-            <a:solidFill>
-              <a:srgbClr val="0000FF"/>
-            </a:solidFill>
-          </p:spPr>
-          <p:style>
-            <a:lnRef idx="1">
-              <a:schemeClr val="accent1"/>
-            </a:lnRef>
-            <a:fillRef idx="3">
-              <a:schemeClr val="accent1"/>
-            </a:fillRef>
-            <a:effectRef idx="2">
-              <a:schemeClr val="accent1"/>
-            </a:effectRef>
-            <a:fontRef idx="minor">
-              <a:schemeClr val="lt1"/>
-            </a:fontRef>
-          </p:style>
-          <p:txBody>
-            <a:bodyPr rtlCol="0" anchor="ctr"/>
-            <a:lstStyle/>
-            <a:p>
-              <a:pPr algn="ctr"/>
-              <a:r>
-                <a:rPr lang="en-US" sz="2400" dirty="0" smtClean="0"/>
-                <a:t>API</a:t>
-              </a:r>
-              <a:endParaRPr lang="en-US" sz="2400" dirty="0"/>
-            </a:p>
-          </p:txBody>
-        </p:sp>
-        <p:sp>
-          <p:nvSpPr>
-            <p:cNvPr id="17" name="Rectangle 16"/>
-            <p:cNvSpPr/>
-            <p:nvPr/>
-          </p:nvSpPr>
-          <p:spPr>
-            <a:xfrm>
-              <a:off x="5339348" y="3328725"/>
-              <a:ext cx="721894" cy="534737"/>
-            </a:xfrm>
-            <a:prstGeom prst="rect">
-              <a:avLst/>
-            </a:prstGeom>
-            <a:solidFill>
-              <a:srgbClr val="0000FF"/>
-            </a:solidFill>
-          </p:spPr>
-          <p:style>
-            <a:lnRef idx="1">
-              <a:schemeClr val="accent1"/>
-            </a:lnRef>
-            <a:fillRef idx="3">
-              <a:schemeClr val="accent1"/>
-            </a:fillRef>
-            <a:effectRef idx="2">
-              <a:schemeClr val="accent1"/>
-            </a:effectRef>
-            <a:fontRef idx="minor">
-              <a:schemeClr val="lt1"/>
-            </a:fontRef>
-          </p:style>
-          <p:txBody>
-            <a:bodyPr rtlCol="0" anchor="ctr"/>
-            <a:lstStyle/>
-            <a:p>
-              <a:pPr algn="ctr"/>
-              <a:r>
-                <a:rPr lang="en-US" sz="2400" dirty="0" smtClean="0"/>
-                <a:t>API</a:t>
-              </a:r>
-              <a:endParaRPr lang="en-US" sz="2400" dirty="0"/>
-            </a:p>
-          </p:txBody>
-        </p:sp>
-        <p:sp>
-          <p:nvSpPr>
-            <p:cNvPr id="19" name="Rectangle 18"/>
-            <p:cNvSpPr/>
-            <p:nvPr/>
-          </p:nvSpPr>
-          <p:spPr>
-            <a:xfrm>
-              <a:off x="2906287" y="307473"/>
-              <a:ext cx="2433061" cy="1203158"/>
-            </a:xfrm>
-            <a:prstGeom prst="rect">
-              <a:avLst/>
-            </a:prstGeom>
-            <a:solidFill>
-              <a:schemeClr val="tx2">
-                <a:lumMod val="40000"/>
-                <a:lumOff val="60000"/>
-              </a:schemeClr>
-            </a:solidFill>
-            <a:ln>
-              <a:noFill/>
-            </a:ln>
-          </p:spPr>
-          <p:style>
-            <a:lnRef idx="1">
-              <a:schemeClr val="accent1"/>
-            </a:lnRef>
-            <a:fillRef idx="3">
-              <a:schemeClr val="accent1"/>
-            </a:fillRef>
-            <a:effectRef idx="2">
-              <a:schemeClr val="accent1"/>
-            </a:effectRef>
-            <a:fontRef idx="minor">
-              <a:schemeClr val="lt1"/>
-            </a:fontRef>
-          </p:style>
-          <p:txBody>
-            <a:bodyPr rtlCol="0" anchor="ctr"/>
-            <a:lstStyle/>
-            <a:p>
-              <a:pPr algn="ctr"/>
-              <a:r>
-                <a:rPr lang="en-US" sz="2000" dirty="0" smtClean="0"/>
-                <a:t>External </a:t>
-              </a:r>
-              <a:r>
-                <a:rPr lang="en-US" sz="2000" dirty="0" smtClean="0"/>
-                <a:t>Client</a:t>
-              </a:r>
-              <a:endParaRPr lang="en-US" sz="2000" dirty="0" smtClean="0"/>
-            </a:p>
-            <a:p>
-              <a:pPr algn="ctr"/>
-              <a:r>
-                <a:rPr lang="en-US" sz="2000" dirty="0" smtClean="0"/>
-                <a:t>(Web, Mobile or </a:t>
-              </a:r>
-              <a:r>
-                <a:rPr lang="en-US" sz="2000" dirty="0" smtClean="0"/>
-                <a:t>Desktop application/web API)</a:t>
-              </a:r>
-              <a:endParaRPr lang="en-US" sz="2000" dirty="0"/>
-            </a:p>
-          </p:txBody>
-        </p:sp>
-        <p:cxnSp>
-          <p:nvCxnSpPr>
-            <p:cNvPr id="21" name="Elbow Connector 20"/>
-            <p:cNvCxnSpPr>
-              <a:stCxn id="19" idx="2"/>
-              <a:endCxn id="14" idx="0"/>
-            </p:cNvCxnSpPr>
-            <p:nvPr/>
-          </p:nvCxnSpPr>
-          <p:spPr>
-            <a:xfrm rot="5400000">
-              <a:off x="2502568" y="1708475"/>
-              <a:ext cx="1818094" cy="1422406"/>
-            </a:xfrm>
-            <a:prstGeom prst="bentConnector3">
-              <a:avLst/>
-            </a:prstGeom>
-            <a:ln>
-              <a:solidFill>
-                <a:schemeClr val="tx1"/>
-              </a:solidFill>
-              <a:tailEnd type="arrow"/>
-            </a:ln>
           </p:spPr>
           <p:style>
             <a:lnRef idx="2">
@@ -4138,176 +4266,53 @@
               <a:schemeClr val="tx1"/>
             </a:fontRef>
           </p:style>
-        </p:cxnSp>
-        <p:cxnSp>
-          <p:nvCxnSpPr>
-            <p:cNvPr id="23" name="Elbow Connector 22"/>
-            <p:cNvCxnSpPr>
-              <a:endCxn id="15" idx="0"/>
-            </p:cNvCxnSpPr>
-            <p:nvPr/>
-          </p:nvCxnSpPr>
-          <p:spPr>
-            <a:xfrm rot="10800000">
-              <a:off x="3622833" y="3328726"/>
-              <a:ext cx="1296746" cy="213895"/>
-            </a:xfrm>
-            <a:prstGeom prst="bentConnector4">
-              <a:avLst>
-                <a:gd name="adj1" fmla="val 1"/>
-                <a:gd name="adj2" fmla="val 206875"/>
-              </a:avLst>
-            </a:prstGeom>
-            <a:ln>
-              <a:solidFill>
-                <a:srgbClr val="000000"/>
-              </a:solidFill>
-              <a:tailEnd type="arrow"/>
-            </a:ln>
-          </p:spPr>
-          <p:style>
-            <a:lnRef idx="2">
-              <a:schemeClr val="accent1"/>
-            </a:lnRef>
-            <a:fillRef idx="0">
-              <a:schemeClr val="accent1"/>
-            </a:fillRef>
-            <a:effectRef idx="1">
-              <a:schemeClr val="accent1"/>
-            </a:effectRef>
-            <a:fontRef idx="minor">
-              <a:schemeClr val="tx1"/>
-            </a:fontRef>
-          </p:style>
-        </p:cxnSp>
-        <p:sp>
-          <p:nvSpPr>
-            <p:cNvPr id="25" name="TextBox 24"/>
-            <p:cNvSpPr txBox="1"/>
-            <p:nvPr/>
-          </p:nvSpPr>
-          <p:spPr>
-            <a:xfrm>
-              <a:off x="2999857" y="1994387"/>
-              <a:ext cx="463062" cy="400110"/>
-            </a:xfrm>
-            <a:prstGeom prst="rect">
-              <a:avLst/>
-            </a:prstGeom>
-            <a:noFill/>
-          </p:spPr>
           <p:txBody>
-            <a:bodyPr wrap="none" rtlCol="0">
-              <a:spAutoFit/>
-            </a:bodyPr>
+            <a:bodyPr rtlCol="0" anchor="ctr"/>
             <a:lstStyle/>
             <a:p>
-              <a:r>
-                <a:rPr lang="en-US" sz="2000" dirty="0" smtClean="0"/>
-                <a:t>(a)</a:t>
-              </a:r>
-              <a:endParaRPr lang="en-US" sz="2000" dirty="0"/>
+              <a:pPr algn="ctr"/>
+              <a:endParaRPr lang="en-US"/>
             </a:p>
           </p:txBody>
         </p:sp>
         <p:sp>
           <p:nvSpPr>
-            <p:cNvPr id="26" name="TextBox 25"/>
-            <p:cNvSpPr txBox="1"/>
+            <p:cNvPr id="3" name="Rectangle 2"/>
+            <p:cNvSpPr/>
             <p:nvPr/>
           </p:nvSpPr>
           <p:spPr>
             <a:xfrm>
-              <a:off x="4101415" y="2694892"/>
-              <a:ext cx="474960" cy="400110"/>
+              <a:off x="7234135" y="3602610"/>
+              <a:ext cx="1364501" cy="707886"/>
             </a:xfrm>
             <a:prstGeom prst="rect">
               <a:avLst/>
             </a:prstGeom>
-            <a:noFill/>
           </p:spPr>
           <p:txBody>
-            <a:bodyPr wrap="none" rtlCol="0">
+            <a:bodyPr wrap="none">
               <a:spAutoFit/>
             </a:bodyPr>
             <a:lstStyle/>
             <a:p>
+              <a:pPr algn="ctr"/>
               <a:r>
                 <a:rPr lang="en-US" sz="2000" dirty="0" smtClean="0"/>
-                <a:t>(b)</a:t>
+                <a:t>Application</a:t>
+              </a:r>
+            </a:p>
+            <a:p>
+              <a:pPr algn="ctr"/>
+              <a:r>
+                <a:rPr lang="en-US" sz="2000" dirty="0" smtClean="0"/>
+                <a:t>Code</a:t>
               </a:r>
               <a:endParaRPr lang="en-US" sz="2000" dirty="0"/>
             </a:p>
           </p:txBody>
         </p:sp>
       </p:grpSp>
-      <p:sp>
-        <p:nvSpPr>
-          <p:cNvPr id="2" name="Right Brace 1"/>
-          <p:cNvSpPr/>
-          <p:nvPr/>
-        </p:nvSpPr>
-        <p:spPr>
-          <a:xfrm>
-            <a:off x="6809874" y="2916463"/>
-            <a:ext cx="462547" cy="2069748"/>
-          </a:xfrm>
-          <a:prstGeom prst="rightBrace">
-            <a:avLst/>
-          </a:prstGeom>
-        </p:spPr>
-        <p:style>
-          <a:lnRef idx="2">
-            <a:schemeClr val="accent1"/>
-          </a:lnRef>
-          <a:fillRef idx="0">
-            <a:schemeClr val="accent1"/>
-          </a:fillRef>
-          <a:effectRef idx="1">
-            <a:schemeClr val="accent1"/>
-          </a:effectRef>
-          <a:fontRef idx="minor">
-            <a:schemeClr val="tx1"/>
-          </a:fontRef>
-        </p:style>
-        <p:txBody>
-          <a:bodyPr rtlCol="0" anchor="ctr"/>
-          <a:lstStyle/>
-          <a:p>
-            <a:pPr algn="ctr"/>
-            <a:endParaRPr lang="en-US"/>
-          </a:p>
-        </p:txBody>
-      </p:sp>
-      <p:sp>
-        <p:nvSpPr>
-          <p:cNvPr id="3" name="Rectangle 2"/>
-          <p:cNvSpPr/>
-          <p:nvPr/>
-        </p:nvSpPr>
-        <p:spPr>
-          <a:xfrm>
-            <a:off x="7194031" y="3629346"/>
-            <a:ext cx="1257526" cy="461665"/>
-          </a:xfrm>
-          <a:prstGeom prst="rect">
-            <a:avLst/>
-          </a:prstGeom>
-        </p:spPr>
-        <p:txBody>
-          <a:bodyPr wrap="none">
-            <a:spAutoFit/>
-          </a:bodyPr>
-          <a:lstStyle/>
-          <a:p>
-            <a:r>
-              <a:rPr lang="en-US" sz="2400" dirty="0" smtClean="0"/>
-              <a:t>Web API </a:t>
-            </a:r>
-            <a:endParaRPr lang="en-US" sz="2400" dirty="0"/>
-          </a:p>
-        </p:txBody>
-      </p:sp>
     </p:spTree>
     <p:extLst>
       <p:ext uri="{BB962C8B-B14F-4D97-AF65-F5344CB8AC3E}">

</xml_diff>

<commit_message>
added exec time results; updated references section
</commit_message>
<xml_diff>
--- a/Eager/paper/oopsla/figures/FigureDesigns.pptx
+++ b/Eager/paper/oopsla/figures/FigureDesigns.pptx
@@ -289,7 +289,7 @@
           <a:p>
             <a:fld id="{5180D103-0C4C-A84A-B553-E839CDB1FABE}" type="datetimeFigureOut">
               <a:rPr lang="en-US" smtClean="0"/>
-              <a:t>3/21/15</a:t>
+              <a:t>3/22/15</a:t>
             </a:fld>
             <a:endParaRPr lang="en-US"/>
           </a:p>
@@ -459,7 +459,7 @@
           <a:p>
             <a:fld id="{5180D103-0C4C-A84A-B553-E839CDB1FABE}" type="datetimeFigureOut">
               <a:rPr lang="en-US" smtClean="0"/>
-              <a:t>3/21/15</a:t>
+              <a:t>3/22/15</a:t>
             </a:fld>
             <a:endParaRPr lang="en-US"/>
           </a:p>
@@ -639,7 +639,7 @@
           <a:p>
             <a:fld id="{5180D103-0C4C-A84A-B553-E839CDB1FABE}" type="datetimeFigureOut">
               <a:rPr lang="en-US" smtClean="0"/>
-              <a:t>3/21/15</a:t>
+              <a:t>3/22/15</a:t>
             </a:fld>
             <a:endParaRPr lang="en-US"/>
           </a:p>
@@ -809,7 +809,7 @@
           <a:p>
             <a:fld id="{5180D103-0C4C-A84A-B553-E839CDB1FABE}" type="datetimeFigureOut">
               <a:rPr lang="en-US" smtClean="0"/>
-              <a:t>3/21/15</a:t>
+              <a:t>3/22/15</a:t>
             </a:fld>
             <a:endParaRPr lang="en-US"/>
           </a:p>
@@ -1055,7 +1055,7 @@
           <a:p>
             <a:fld id="{5180D103-0C4C-A84A-B553-E839CDB1FABE}" type="datetimeFigureOut">
               <a:rPr lang="en-US" smtClean="0"/>
-              <a:t>3/21/15</a:t>
+              <a:t>3/22/15</a:t>
             </a:fld>
             <a:endParaRPr lang="en-US"/>
           </a:p>
@@ -1343,7 +1343,7 @@
           <a:p>
             <a:fld id="{5180D103-0C4C-A84A-B553-E839CDB1FABE}" type="datetimeFigureOut">
               <a:rPr lang="en-US" smtClean="0"/>
-              <a:t>3/21/15</a:t>
+              <a:t>3/22/15</a:t>
             </a:fld>
             <a:endParaRPr lang="en-US"/>
           </a:p>
@@ -1765,7 +1765,7 @@
           <a:p>
             <a:fld id="{5180D103-0C4C-A84A-B553-E839CDB1FABE}" type="datetimeFigureOut">
               <a:rPr lang="en-US" smtClean="0"/>
-              <a:t>3/21/15</a:t>
+              <a:t>3/22/15</a:t>
             </a:fld>
             <a:endParaRPr lang="en-US"/>
           </a:p>
@@ -1883,7 +1883,7 @@
           <a:p>
             <a:fld id="{5180D103-0C4C-A84A-B553-E839CDB1FABE}" type="datetimeFigureOut">
               <a:rPr lang="en-US" smtClean="0"/>
-              <a:t>3/21/15</a:t>
+              <a:t>3/22/15</a:t>
             </a:fld>
             <a:endParaRPr lang="en-US"/>
           </a:p>
@@ -1978,7 +1978,7 @@
           <a:p>
             <a:fld id="{5180D103-0C4C-A84A-B553-E839CDB1FABE}" type="datetimeFigureOut">
               <a:rPr lang="en-US" smtClean="0"/>
-              <a:t>3/21/15</a:t>
+              <a:t>3/22/15</a:t>
             </a:fld>
             <a:endParaRPr lang="en-US"/>
           </a:p>
@@ -2255,7 +2255,7 @@
           <a:p>
             <a:fld id="{5180D103-0C4C-A84A-B553-E839CDB1FABE}" type="datetimeFigureOut">
               <a:rPr lang="en-US" smtClean="0"/>
-              <a:t>3/21/15</a:t>
+              <a:t>3/22/15</a:t>
             </a:fld>
             <a:endParaRPr lang="en-US"/>
           </a:p>
@@ -2508,7 +2508,7 @@
           <a:p>
             <a:fld id="{5180D103-0C4C-A84A-B553-E839CDB1FABE}" type="datetimeFigureOut">
               <a:rPr lang="en-US" smtClean="0"/>
-              <a:t>3/21/15</a:t>
+              <a:t>3/22/15</a:t>
             </a:fld>
             <a:endParaRPr lang="en-US"/>
           </a:p>
@@ -2721,7 +2721,7 @@
           <a:p>
             <a:fld id="{5180D103-0C4C-A84A-B553-E839CDB1FABE}" type="datetimeFigureOut">
               <a:rPr lang="en-US" smtClean="0"/>
-              <a:t>3/21/15</a:t>
+              <a:t>3/22/15</a:t>
             </a:fld>
             <a:endParaRPr lang="en-US"/>
           </a:p>
@@ -3105,9 +3105,9 @@
         <p:grpSpPr>
           <a:xfrm>
             <a:off x="106955" y="0"/>
-            <a:ext cx="8706193" cy="6376722"/>
+            <a:ext cx="8897109" cy="6376722"/>
             <a:chOff x="106955" y="0"/>
-            <a:chExt cx="8706193" cy="6376722"/>
+            <a:chExt cx="8897109" cy="6376722"/>
           </a:xfrm>
         </p:grpSpPr>
         <p:sp>
@@ -3204,7 +3204,7 @@
           </p:nvSpPr>
           <p:spPr>
             <a:xfrm>
-              <a:off x="2820739" y="2757901"/>
+              <a:off x="2633577" y="2757901"/>
               <a:ext cx="1417050" cy="949157"/>
             </a:xfrm>
             <a:prstGeom prst="rect">
@@ -3237,10 +3237,10 @@
             <a:p>
               <a:pPr algn="ctr"/>
               <a:r>
-                <a:rPr lang="en-US" dirty="0" smtClean="0"/>
+                <a:rPr lang="en-US" b="1" dirty="0" smtClean="0"/>
                 <a:t>Cloud SDK Monitor</a:t>
               </a:r>
-              <a:endParaRPr lang="en-US" dirty="0"/>
+              <a:endParaRPr lang="en-US" b="1" dirty="0"/>
             </a:p>
           </p:txBody>
         </p:sp>
@@ -3285,21 +3285,17 @@
             <a:p>
               <a:pPr algn="ctr"/>
               <a:r>
-                <a:rPr lang="en-US" dirty="0" smtClean="0"/>
-                <a:t>SLA </a:t>
-              </a:r>
-              <a:r>
-                <a:rPr lang="en-US" dirty="0" smtClean="0"/>
-                <a:t>Predictor</a:t>
+                <a:rPr lang="en-US" b="1" dirty="0" smtClean="0"/>
+                <a:t>SLA Predictor</a:t>
               </a:r>
             </a:p>
             <a:p>
               <a:pPr algn="ctr"/>
               <a:r>
-                <a:rPr lang="en-US" sz="1400" dirty="0" smtClean="0"/>
+                <a:rPr lang="en-US" sz="1500" dirty="0" smtClean="0"/>
                 <a:t>(Time series aggregation &amp; QBETS)</a:t>
               </a:r>
-              <a:endParaRPr lang="en-US" sz="1400" dirty="0"/>
+              <a:endParaRPr lang="en-US" sz="1500" dirty="0"/>
             </a:p>
           </p:txBody>
         </p:sp>
@@ -3344,10 +3340,10 @@
             <a:p>
               <a:pPr algn="ctr"/>
               <a:r>
-                <a:rPr lang="en-US" dirty="0" smtClean="0"/>
+                <a:rPr lang="en-US" b="1" dirty="0" smtClean="0"/>
                 <a:t>Static Analyzer</a:t>
               </a:r>
-              <a:endParaRPr lang="en-US" dirty="0"/>
+              <a:endParaRPr lang="en-US" b="1" dirty="0"/>
             </a:p>
           </p:txBody>
         </p:sp>
@@ -3480,8 +3476,8 @@
           </p:nvSpPr>
           <p:spPr>
             <a:xfrm>
-              <a:off x="6891419" y="1811612"/>
-              <a:ext cx="1116267" cy="523220"/>
+              <a:off x="6918155" y="1771508"/>
+              <a:ext cx="1116267" cy="584776"/>
             </a:xfrm>
             <a:prstGeom prst="rect">
               <a:avLst/>
@@ -3496,10 +3492,10 @@
             <a:p>
               <a:pPr algn="ctr"/>
               <a:r>
-                <a:rPr lang="en-US" sz="1400" dirty="0" smtClean="0"/>
+                <a:rPr lang="en-US" sz="1600" dirty="0" smtClean="0"/>
                 <a:t>Web API code</a:t>
               </a:r>
-              <a:endParaRPr lang="en-US" sz="1400" dirty="0"/>
+              <a:endParaRPr lang="en-US" sz="1600" dirty="0"/>
             </a:p>
           </p:txBody>
         </p:sp>
@@ -3511,8 +3507,8 @@
           </p:nvSpPr>
           <p:spPr>
             <a:xfrm>
-              <a:off x="7078579" y="4197684"/>
-              <a:ext cx="1734569" cy="523220"/>
+              <a:off x="7048080" y="4197684"/>
+              <a:ext cx="1955984" cy="584776"/>
             </a:xfrm>
             <a:prstGeom prst="rect">
               <a:avLst/>
@@ -3527,17 +3523,17 @@
             <a:p>
               <a:pPr algn="ctr"/>
               <a:r>
-                <a:rPr lang="en-US" sz="1400" dirty="0" smtClean="0"/>
+                <a:rPr lang="en-US" sz="1600" dirty="0" smtClean="0"/>
                 <a:t>Cloud SDK invocation</a:t>
               </a:r>
             </a:p>
             <a:p>
               <a:pPr algn="ctr"/>
               <a:r>
-                <a:rPr lang="en-US" sz="1400" dirty="0" smtClean="0"/>
+                <a:rPr lang="en-US" sz="1600" dirty="0" smtClean="0"/>
                 <a:t>sequences</a:t>
               </a:r>
-              <a:endParaRPr lang="en-US" sz="1400" dirty="0"/>
+              <a:endParaRPr lang="en-US" sz="1600" dirty="0"/>
             </a:p>
           </p:txBody>
         </p:sp>
@@ -3549,8 +3545,8 @@
           </p:nvSpPr>
           <p:spPr>
             <a:xfrm>
-              <a:off x="3672319" y="5214060"/>
-              <a:ext cx="1879566" cy="523220"/>
+              <a:off x="3444311" y="5160588"/>
+              <a:ext cx="2121695" cy="584776"/>
             </a:xfrm>
             <a:prstGeom prst="rect">
               <a:avLst/>
@@ -3565,17 +3561,17 @@
             <a:p>
               <a:pPr algn="ctr"/>
               <a:r>
-                <a:rPr lang="en-US" sz="1400" dirty="0" smtClean="0"/>
+                <a:rPr lang="en-US" sz="1600" dirty="0" smtClean="0"/>
                 <a:t>Fetch cloud monitoring </a:t>
               </a:r>
             </a:p>
             <a:p>
               <a:pPr algn="ctr"/>
               <a:r>
-                <a:rPr lang="en-US" sz="1400" dirty="0" smtClean="0"/>
+                <a:rPr lang="en-US" sz="1600" dirty="0" smtClean="0"/>
                 <a:t>data</a:t>
               </a:r>
-              <a:endParaRPr lang="en-US" sz="1400" dirty="0"/>
+              <a:endParaRPr lang="en-US" sz="1600" dirty="0"/>
             </a:p>
           </p:txBody>
         </p:sp>
@@ -3587,8 +3583,8 @@
           </p:nvSpPr>
           <p:spPr>
             <a:xfrm rot="5400000">
-              <a:off x="3457730" y="3667636"/>
-              <a:ext cx="2232526" cy="2463782"/>
+              <a:off x="3357469" y="3567374"/>
+              <a:ext cx="2232526" cy="2664305"/>
             </a:xfrm>
             <a:prstGeom prst="leftUpArrow">
               <a:avLst>
@@ -3952,10 +3948,10 @@
               <a:p>
                 <a:pPr algn="ctr"/>
                 <a:r>
-                  <a:rPr lang="en-US" sz="1600" dirty="0" smtClean="0"/>
+                  <a:rPr lang="en-US" sz="1600" b="1" dirty="0" smtClean="0"/>
                   <a:t>Web API</a:t>
                 </a:r>
-                <a:endParaRPr lang="en-US" sz="1600" dirty="0"/>
+                <a:endParaRPr lang="en-US" sz="1600" b="1" dirty="0"/>
               </a:p>
             </p:txBody>
           </p:sp>
@@ -3997,10 +3993,10 @@
               <a:p>
                 <a:pPr algn="ctr"/>
                 <a:r>
-                  <a:rPr lang="en-US" sz="1600" dirty="0" smtClean="0"/>
+                  <a:rPr lang="en-US" sz="1600" b="1" dirty="0" smtClean="0"/>
                   <a:t>Web API</a:t>
                 </a:r>
-                <a:endParaRPr lang="en-US" sz="1600" dirty="0"/>
+                <a:endParaRPr lang="en-US" sz="1600" b="1" dirty="0"/>
               </a:p>
             </p:txBody>
           </p:sp>
@@ -4042,10 +4038,10 @@
               <a:p>
                 <a:pPr algn="ctr"/>
                 <a:r>
-                  <a:rPr lang="en-US" sz="1600" dirty="0" smtClean="0"/>
+                  <a:rPr lang="en-US" sz="1600" b="1" dirty="0" smtClean="0"/>
                   <a:t>Web API</a:t>
                 </a:r>
-                <a:endParaRPr lang="en-US" sz="1600" dirty="0"/>
+                <a:endParaRPr lang="en-US" sz="1600" b="1" dirty="0"/>
               </a:p>
             </p:txBody>
           </p:sp>

</xml_diff>